<commit_message>
fixed non energy use sales being halved
</commit_message>
<xml_diff>
--- a/documentation/korea assumptions.pptx
+++ b/documentation/korea assumptions.pptx
@@ -110,6 +110,11 @@
       </a:defRPr>
     </a:lvl9pPr>
   </p:defaultTextStyle>
+  <p:extLst>
+    <p:ext uri="{EFAFB233-063F-42B5-8137-9DF3F51BA10A}">
+      <p15:sldGuideLst xmlns:p15="http://schemas.microsoft.com/office/powerpoint/2012/main"/>
+    </p:ext>
+  </p:extLst>
 </p:presentation>
 </file>
 
@@ -3403,11 +3408,17 @@
           <p:cNvGraphicFramePr>
             <a:graphicFrameLocks noGrp="1"/>
           </p:cNvGraphicFramePr>
-          <p:nvPr/>
+          <p:nvPr>
+            <p:extLst>
+              <p:ext uri="{D42A27DB-BD31-4B8C-83A1-F6EECF244321}">
+                <p14:modId xmlns:p14="http://schemas.microsoft.com/office/powerpoint/2010/main" val="3636828551"/>
+              </p:ext>
+            </p:extLst>
+          </p:nvPr>
         </p:nvGraphicFramePr>
         <p:xfrm>
           <a:off x="2032000" y="719666"/>
-          <a:ext cx="8128000" cy="1854200"/>
+          <a:ext cx="8127999" cy="3486150"/>
         </p:xfrm>
         <a:graphic>
           <a:graphicData uri="http://schemas.openxmlformats.org/drawingml/2006/table">
@@ -3416,14 +3427,21 @@
                 <a:tableStyleId>{5C22544A-7EE6-4342-B048-85BDC9FD1C3A}</a:tableStyleId>
               </a:tblPr>
               <a:tblGrid>
-                <a:gridCol w="4064000">
+                <a:gridCol w="2709333">
                   <a:extLst>
                     <a:ext uri="{9D8B030D-6E8A-4147-A177-3AD203B41FA5}">
                       <a16:colId xmlns:a16="http://schemas.microsoft.com/office/drawing/2014/main" val="450665849"/>
                     </a:ext>
                   </a:extLst>
                 </a:gridCol>
-                <a:gridCol w="4064000">
+                <a:gridCol w="2709333">
+                  <a:extLst>
+                    <a:ext uri="{9D8B030D-6E8A-4147-A177-3AD203B41FA5}">
+                      <a16:colId xmlns:a16="http://schemas.microsoft.com/office/drawing/2014/main" val="3995184610"/>
+                    </a:ext>
+                  </a:extLst>
+                </a:gridCol>
+                <a:gridCol w="2709333">
                   <a:extLst>
                     <a:ext uri="{9D8B030D-6E8A-4147-A177-3AD203B41FA5}">
                       <a16:colId xmlns:a16="http://schemas.microsoft.com/office/drawing/2014/main" val="2643544389"/>
@@ -3447,7 +3465,23 @@
                     <a:bodyPr/>
                     <a:lstStyle/>
                     <a:p>
-                      <a:endParaRPr lang="en-US"/>
+                      <a:r>
+                        <a:rPr lang="en-US" dirty="0"/>
+                        <a:t>Ref</a:t>
+                      </a:r>
+                    </a:p>
+                  </a:txBody>
+                  <a:tcPr/>
+                </a:tc>
+                <a:tc>
+                  <a:txBody>
+                    <a:bodyPr/>
+                    <a:lstStyle/>
+                    <a:p>
+                      <a:r>
+                        <a:rPr lang="en-US" dirty="0"/>
+                        <a:t>target</a:t>
+                      </a:r>
                     </a:p>
                   </a:txBody>
                   <a:tcPr/>
@@ -3464,7 +3498,32 @@
                     <a:bodyPr/>
                     <a:lstStyle/>
                     <a:p>
-                      <a:endParaRPr lang="en-US"/>
+                      <a:pPr marL="0" marR="0">
+                        <a:lnSpc>
+                          <a:spcPct val="107000"/>
+                        </a:lnSpc>
+                        <a:spcBef>
+                          <a:spcPts val="0"/>
+                        </a:spcBef>
+                        <a:spcAft>
+                          <a:spcPts val="800"/>
+                        </a:spcAft>
+                      </a:pPr>
+                      <a:r>
+                        <a:rPr lang="en-US" sz="1100" b="1" kern="100" dirty="0">
+                          <a:effectLst/>
+                          <a:latin typeface="Calibri" panose="020F0502020204030204" pitchFamily="34" charset="0"/>
+                          <a:ea typeface="Yu Mincho" panose="02020400000000000000" pitchFamily="18" charset="-128"/>
+                          <a:cs typeface="Arial" panose="020B0604020202020204" pitchFamily="34" charset="0"/>
+                        </a:rPr>
+                        <a:t>Transport</a:t>
+                      </a:r>
+                      <a:endParaRPr lang="en-US" sz="1100" kern="100" dirty="0">
+                        <a:effectLst/>
+                        <a:latin typeface="Calibri" panose="020F0502020204030204" pitchFamily="34" charset="0"/>
+                        <a:ea typeface="Yu Mincho" panose="02020400000000000000" pitchFamily="18" charset="-128"/>
+                        <a:cs typeface="Arial" panose="020B0604020202020204" pitchFamily="34" charset="0"/>
+                      </a:endParaRPr>
                     </a:p>
                   </a:txBody>
                   <a:tcPr/>
@@ -3474,7 +3533,327 @@
                     <a:bodyPr/>
                     <a:lstStyle/>
                     <a:p>
-                      <a:endParaRPr lang="en-US"/>
+                      <a:pPr marL="342900" marR="0" lvl="0" indent="-342900">
+                        <a:lnSpc>
+                          <a:spcPct val="107000"/>
+                        </a:lnSpc>
+                        <a:spcBef>
+                          <a:spcPts val="0"/>
+                        </a:spcBef>
+                        <a:spcAft>
+                          <a:spcPts val="800"/>
+                        </a:spcAft>
+                        <a:buFont typeface="Arial" panose="020B0604020202020204" pitchFamily="34" charset="0"/>
+                        <a:buChar char="•"/>
+                        <a:tabLst>
+                          <a:tab pos="457200" algn="l"/>
+                        </a:tabLst>
+                      </a:pPr>
+                      <a:r>
+                        <a:rPr lang="en-US" sz="1100" b="1" kern="100">
+                          <a:effectLst/>
+                          <a:latin typeface="Calibri" panose="020F0502020204030204" pitchFamily="34" charset="0"/>
+                          <a:ea typeface="Yu Mincho" panose="02020400000000000000" pitchFamily="18" charset="-128"/>
+                          <a:cs typeface="Times New Roman" panose="02020603050405020304" pitchFamily="18" charset="0"/>
+                        </a:rPr>
+                        <a:t>Decrease of diesel consumption and increase of EVs and HVs</a:t>
+                      </a:r>
+                      <a:endParaRPr lang="en-US" sz="1100" kern="100">
+                        <a:effectLst/>
+                        <a:latin typeface="Calibri" panose="020F0502020204030204" pitchFamily="34" charset="0"/>
+                        <a:ea typeface="Yu Mincho" panose="02020400000000000000" pitchFamily="18" charset="-128"/>
+                        <a:cs typeface="Times New Roman" panose="02020603050405020304" pitchFamily="18" charset="0"/>
+                      </a:endParaRPr>
+                    </a:p>
+                    <a:p>
+                      <a:pPr marL="342900" marR="0" lvl="0" indent="-342900">
+                        <a:lnSpc>
+                          <a:spcPct val="107000"/>
+                        </a:lnSpc>
+                        <a:spcBef>
+                          <a:spcPts val="0"/>
+                        </a:spcBef>
+                        <a:spcAft>
+                          <a:spcPts val="800"/>
+                        </a:spcAft>
+                        <a:buFont typeface="Arial" panose="020B0604020202020204" pitchFamily="34" charset="0"/>
+                        <a:buChar char="•"/>
+                        <a:tabLst>
+                          <a:tab pos="457200" algn="l"/>
+                        </a:tabLst>
+                      </a:pPr>
+                      <a:r>
+                        <a:rPr lang="en-US" sz="1100" b="1" kern="100">
+                          <a:effectLst/>
+                          <a:highlight>
+                            <a:srgbClr val="FFFF00"/>
+                          </a:highlight>
+                          <a:latin typeface="Calibri" panose="020F0502020204030204" pitchFamily="34" charset="0"/>
+                          <a:ea typeface="Yu Mincho" panose="02020400000000000000" pitchFamily="18" charset="-128"/>
+                          <a:cs typeface="Times New Roman" panose="02020603050405020304" pitchFamily="18" charset="0"/>
+                        </a:rPr>
+                        <a:t>XX</a:t>
+                      </a:r>
+                      <a:r>
+                        <a:rPr lang="en-US" sz="1100" b="1" kern="100">
+                          <a:effectLst/>
+                          <a:latin typeface="Calibri" panose="020F0502020204030204" pitchFamily="34" charset="0"/>
+                          <a:ea typeface="Yu Mincho" panose="02020400000000000000" pitchFamily="18" charset="-128"/>
+                          <a:cs typeface="Times New Roman" panose="02020603050405020304" pitchFamily="18" charset="0"/>
+                        </a:rPr>
+                        <a:t>% sale of eco-friendly vehicles* in entire vehicles for new passenger by 2030</a:t>
+                      </a:r>
+                      <a:endParaRPr lang="en-US" sz="1100" kern="100">
+                        <a:effectLst/>
+                        <a:latin typeface="Calibri" panose="020F0502020204030204" pitchFamily="34" charset="0"/>
+                        <a:ea typeface="Yu Mincho" panose="02020400000000000000" pitchFamily="18" charset="-128"/>
+                        <a:cs typeface="Times New Roman" panose="02020603050405020304" pitchFamily="18" charset="0"/>
+                      </a:endParaRPr>
+                    </a:p>
+                    <a:p>
+                      <a:pPr marL="457200" marR="0">
+                        <a:lnSpc>
+                          <a:spcPct val="107000"/>
+                        </a:lnSpc>
+                        <a:spcBef>
+                          <a:spcPts val="0"/>
+                        </a:spcBef>
+                        <a:spcAft>
+                          <a:spcPts val="800"/>
+                        </a:spcAft>
+                      </a:pPr>
+                      <a:r>
+                        <a:rPr lang="en-US" sz="1100" b="1" kern="100">
+                          <a:effectLst/>
+                          <a:latin typeface="Calibri" panose="020F0502020204030204" pitchFamily="34" charset="0"/>
+                          <a:ea typeface="Yu Mincho" panose="02020400000000000000" pitchFamily="18" charset="-128"/>
+                          <a:cs typeface="Arial" panose="020B0604020202020204" pitchFamily="34" charset="0"/>
+                        </a:rPr>
+                        <a:t>* EVs, HVs, and Hybrid vehicles</a:t>
+                      </a:r>
+                      <a:endParaRPr lang="en-US" sz="1100" kern="100">
+                        <a:effectLst/>
+                        <a:latin typeface="Calibri" panose="020F0502020204030204" pitchFamily="34" charset="0"/>
+                        <a:ea typeface="Yu Mincho" panose="02020400000000000000" pitchFamily="18" charset="-128"/>
+                        <a:cs typeface="Arial" panose="020B0604020202020204" pitchFamily="34" charset="0"/>
+                      </a:endParaRPr>
+                    </a:p>
+                    <a:p>
+                      <a:pPr marL="342900" marR="0" lvl="0" indent="-342900">
+                        <a:lnSpc>
+                          <a:spcPct val="107000"/>
+                        </a:lnSpc>
+                        <a:spcBef>
+                          <a:spcPts val="0"/>
+                        </a:spcBef>
+                        <a:spcAft>
+                          <a:spcPts val="0"/>
+                        </a:spcAft>
+                        <a:buFont typeface="Arial" panose="020B0604020202020204" pitchFamily="34" charset="0"/>
+                        <a:buChar char="•"/>
+                        <a:tabLst>
+                          <a:tab pos="457200" algn="l"/>
+                        </a:tabLst>
+                      </a:pPr>
+                      <a:r>
+                        <a:rPr lang="en-US" sz="1100" b="1" kern="100">
+                          <a:effectLst/>
+                          <a:highlight>
+                            <a:srgbClr val="FFFF00"/>
+                          </a:highlight>
+                          <a:latin typeface="Calibri" panose="020F0502020204030204" pitchFamily="34" charset="0"/>
+                          <a:ea typeface="Calibri" panose="020F0502020204030204" pitchFamily="34" charset="0"/>
+                          <a:cs typeface="Times New Roman" panose="02020603050405020304" pitchFamily="18" charset="0"/>
+                        </a:rPr>
+                        <a:t>XX</a:t>
+                      </a:r>
+                      <a:r>
+                        <a:rPr lang="en-US" sz="1100" b="1" kern="100">
+                          <a:effectLst/>
+                          <a:latin typeface="Calibri" panose="020F0502020204030204" pitchFamily="34" charset="0"/>
+                          <a:ea typeface="Calibri" panose="020F0502020204030204" pitchFamily="34" charset="0"/>
+                          <a:cs typeface="Times New Roman" panose="02020603050405020304" pitchFamily="18" charset="0"/>
+                        </a:rPr>
+                        <a:t>% </a:t>
+                      </a:r>
+                      <a:r>
+                        <a:rPr lang="en-GB" sz="1100" b="1" kern="100">
+                          <a:effectLst/>
+                          <a:latin typeface="Calibri" panose="020F0502020204030204" pitchFamily="34" charset="0"/>
+                          <a:ea typeface="Calibri" panose="020F0502020204030204" pitchFamily="34" charset="0"/>
+                          <a:cs typeface="Times New Roman" panose="02020603050405020304" pitchFamily="18" charset="0"/>
+                        </a:rPr>
+                        <a:t>sale </a:t>
+                      </a:r>
+                      <a:r>
+                        <a:rPr lang="en-US" sz="1100" b="1" kern="100">
+                          <a:effectLst/>
+                          <a:latin typeface="Calibri" panose="020F0502020204030204" pitchFamily="34" charset="0"/>
+                          <a:ea typeface="Calibri" panose="020F0502020204030204" pitchFamily="34" charset="0"/>
+                          <a:cs typeface="Times New Roman" panose="02020603050405020304" pitchFamily="18" charset="0"/>
+                        </a:rPr>
+                        <a:t>of </a:t>
+                      </a:r>
+                      <a:r>
+                        <a:rPr lang="en-GB" sz="1100" b="1" kern="100">
+                          <a:effectLst/>
+                          <a:latin typeface="Calibri" panose="020F0502020204030204" pitchFamily="34" charset="0"/>
+                          <a:ea typeface="Calibri" panose="020F0502020204030204" pitchFamily="34" charset="0"/>
+                          <a:cs typeface="Times New Roman" panose="02020603050405020304" pitchFamily="18" charset="0"/>
+                        </a:rPr>
+                        <a:t>eco-friendly vehicles in entire vehicles</a:t>
+                      </a:r>
+                      <a:r>
+                        <a:rPr lang="en-US" sz="1100" b="1" kern="100">
+                          <a:effectLst/>
+                          <a:latin typeface="Calibri" panose="020F0502020204030204" pitchFamily="34" charset="0"/>
+                          <a:ea typeface="Calibri" panose="020F0502020204030204" pitchFamily="34" charset="0"/>
+                          <a:cs typeface="Times New Roman" panose="02020603050405020304" pitchFamily="18" charset="0"/>
+                        </a:rPr>
+                        <a:t> for new passenger by 20</a:t>
+                      </a:r>
+                      <a:r>
+                        <a:rPr lang="en-GB" sz="1100" b="1" kern="100">
+                          <a:effectLst/>
+                          <a:latin typeface="Calibri" panose="020F0502020204030204" pitchFamily="34" charset="0"/>
+                          <a:ea typeface="Calibri" panose="020F0502020204030204" pitchFamily="34" charset="0"/>
+                          <a:cs typeface="Times New Roman" panose="02020603050405020304" pitchFamily="18" charset="0"/>
+                        </a:rPr>
+                        <a:t>5</a:t>
+                      </a:r>
+                      <a:r>
+                        <a:rPr lang="en-US" sz="1100" b="1" kern="100">
+                          <a:effectLst/>
+                          <a:latin typeface="Calibri" panose="020F0502020204030204" pitchFamily="34" charset="0"/>
+                          <a:ea typeface="Calibri" panose="020F0502020204030204" pitchFamily="34" charset="0"/>
+                          <a:cs typeface="Times New Roman" panose="02020603050405020304" pitchFamily="18" charset="0"/>
+                        </a:rPr>
+                        <a:t>0</a:t>
+                      </a:r>
+                      <a:endParaRPr lang="en-US" sz="1100" kern="100">
+                        <a:effectLst/>
+                        <a:latin typeface="Calibri" panose="020F0502020204030204" pitchFamily="34" charset="0"/>
+                        <a:ea typeface="Calibri" panose="020F0502020204030204" pitchFamily="34" charset="0"/>
+                        <a:cs typeface="Times New Roman" panose="02020603050405020304" pitchFamily="18" charset="0"/>
+                      </a:endParaRPr>
+                    </a:p>
+                  </a:txBody>
+                  <a:tcPr/>
+                </a:tc>
+                <a:tc>
+                  <a:txBody>
+                    <a:bodyPr/>
+                    <a:lstStyle/>
+                    <a:p>
+                      <a:pPr marL="342900" marR="0" lvl="0" indent="-342900">
+                        <a:lnSpc>
+                          <a:spcPct val="107000"/>
+                        </a:lnSpc>
+                        <a:spcBef>
+                          <a:spcPts val="0"/>
+                        </a:spcBef>
+                        <a:spcAft>
+                          <a:spcPts val="800"/>
+                        </a:spcAft>
+                        <a:buFont typeface="Arial" panose="020B0604020202020204" pitchFamily="34" charset="0"/>
+                        <a:buChar char="•"/>
+                        <a:tabLst>
+                          <a:tab pos="457200" algn="l"/>
+                        </a:tabLst>
+                      </a:pPr>
+                      <a:r>
+                        <a:rPr lang="en-US" sz="1100" b="1" kern="100" dirty="0">
+                          <a:effectLst/>
+                          <a:latin typeface="Calibri" panose="020F0502020204030204" pitchFamily="34" charset="0"/>
+                          <a:ea typeface="Yu Mincho" panose="02020400000000000000" pitchFamily="18" charset="-128"/>
+                          <a:cs typeface="Times New Roman" panose="02020603050405020304" pitchFamily="18" charset="0"/>
+                        </a:rPr>
+                        <a:t>Scaling up deployment of various mobilities such as EVs, HVs, and LNG-fueled ships</a:t>
+                      </a:r>
+                      <a:endParaRPr lang="en-US" sz="1100" kern="100" dirty="0">
+                        <a:effectLst/>
+                        <a:latin typeface="Calibri" panose="020F0502020204030204" pitchFamily="34" charset="0"/>
+                        <a:ea typeface="Yu Mincho" panose="02020400000000000000" pitchFamily="18" charset="-128"/>
+                        <a:cs typeface="Times New Roman" panose="02020603050405020304" pitchFamily="18" charset="0"/>
+                      </a:endParaRPr>
+                    </a:p>
+                    <a:p>
+                      <a:pPr marL="342900" marR="0" lvl="0" indent="-342900">
+                        <a:lnSpc>
+                          <a:spcPct val="107000"/>
+                        </a:lnSpc>
+                        <a:spcBef>
+                          <a:spcPts val="0"/>
+                        </a:spcBef>
+                        <a:spcAft>
+                          <a:spcPts val="800"/>
+                        </a:spcAft>
+                        <a:buFont typeface="Arial" panose="020B0604020202020204" pitchFamily="34" charset="0"/>
+                        <a:buChar char="•"/>
+                        <a:tabLst>
+                          <a:tab pos="457200" algn="l"/>
+                        </a:tabLst>
+                      </a:pPr>
+                      <a:r>
+                        <a:rPr lang="en-US" sz="1100" b="1" kern="100" dirty="0">
+                          <a:effectLst/>
+                          <a:latin typeface="Calibri" panose="020F0502020204030204" pitchFamily="34" charset="0"/>
+                          <a:ea typeface="Yu Mincho" panose="02020400000000000000" pitchFamily="18" charset="-128"/>
+                          <a:cs typeface="Times New Roman" panose="02020603050405020304" pitchFamily="18" charset="0"/>
+                        </a:rPr>
+                        <a:t>83% sale of eco-friendly vehicles in entire vehicles for new passenger by 2030</a:t>
+                      </a:r>
+                      <a:endParaRPr lang="en-US" sz="1100" kern="100" dirty="0">
+                        <a:effectLst/>
+                        <a:latin typeface="Calibri" panose="020F0502020204030204" pitchFamily="34" charset="0"/>
+                        <a:ea typeface="Yu Mincho" panose="02020400000000000000" pitchFamily="18" charset="-128"/>
+                        <a:cs typeface="Times New Roman" panose="02020603050405020304" pitchFamily="18" charset="0"/>
+                      </a:endParaRPr>
+                    </a:p>
+                    <a:p>
+                      <a:pPr marL="342900" marR="0" lvl="0" indent="-342900">
+                        <a:lnSpc>
+                          <a:spcPct val="107000"/>
+                        </a:lnSpc>
+                        <a:spcBef>
+                          <a:spcPts val="0"/>
+                        </a:spcBef>
+                        <a:spcAft>
+                          <a:spcPts val="800"/>
+                        </a:spcAft>
+                        <a:buFont typeface="Arial" panose="020B0604020202020204" pitchFamily="34" charset="0"/>
+                        <a:buChar char="•"/>
+                        <a:tabLst>
+                          <a:tab pos="457200" algn="l"/>
+                        </a:tabLst>
+                      </a:pPr>
+                      <a:r>
+                        <a:rPr lang="en-US" sz="1100" b="1" kern="100" dirty="0">
+                          <a:effectLst/>
+                          <a:highlight>
+                            <a:srgbClr val="FFFF00"/>
+                          </a:highlight>
+                          <a:latin typeface="Calibri" panose="020F0502020204030204" pitchFamily="34" charset="0"/>
+                          <a:ea typeface="Yu Mincho" panose="02020400000000000000" pitchFamily="18" charset="-128"/>
+                          <a:cs typeface="Times New Roman" panose="02020603050405020304" pitchFamily="18" charset="0"/>
+                        </a:rPr>
+                        <a:t>XX</a:t>
+                      </a:r>
+                      <a:r>
+                        <a:rPr lang="en-US" sz="1100" b="1" kern="100" dirty="0">
+                          <a:effectLst/>
+                          <a:latin typeface="Calibri" panose="020F0502020204030204" pitchFamily="34" charset="0"/>
+                          <a:ea typeface="Yu Mincho" panose="02020400000000000000" pitchFamily="18" charset="-128"/>
+                          <a:cs typeface="Times New Roman" panose="02020603050405020304" pitchFamily="18" charset="0"/>
+                        </a:rPr>
+                        <a:t>% sale of eco-friendly vehicles in entire vehicles for new passenger by 2050  </a:t>
+                      </a:r>
+                      <a:endParaRPr lang="en-US" sz="1100" kern="100" dirty="0">
+                        <a:effectLst/>
+                        <a:latin typeface="Calibri" panose="020F0502020204030204" pitchFamily="34" charset="0"/>
+                        <a:ea typeface="Yu Mincho" panose="02020400000000000000" pitchFamily="18" charset="-128"/>
+                        <a:cs typeface="Times New Roman" panose="02020603050405020304" pitchFamily="18" charset="0"/>
+                      </a:endParaRPr>
                     </a:p>
                   </a:txBody>
                   <a:tcPr/>
@@ -3486,6 +3865,16 @@
                 </a:extLst>
               </a:tr>
               <a:tr h="370840">
+                <a:tc>
+                  <a:txBody>
+                    <a:bodyPr/>
+                    <a:lstStyle/>
+                    <a:p>
+                      <a:endParaRPr lang="en-US"/>
+                    </a:p>
+                  </a:txBody>
+                  <a:tcPr/>
+                </a:tc>
                 <a:tc>
                   <a:txBody>
                     <a:bodyPr/>
@@ -3533,6 +3922,16 @@
                   </a:txBody>
                   <a:tcPr/>
                 </a:tc>
+                <a:tc>
+                  <a:txBody>
+                    <a:bodyPr/>
+                    <a:lstStyle/>
+                    <a:p>
+                      <a:endParaRPr lang="en-US"/>
+                    </a:p>
+                  </a:txBody>
+                  <a:tcPr/>
+                </a:tc>
                 <a:extLst>
                   <a:ext uri="{0D108BD9-81ED-4DB2-BD59-A6C34878D82A}">
                     <a16:rowId xmlns:a16="http://schemas.microsoft.com/office/drawing/2014/main" val="3869988052"/>
@@ -3540,6 +3939,16 @@
                 </a:extLst>
               </a:tr>
               <a:tr h="370840">
+                <a:tc>
+                  <a:txBody>
+                    <a:bodyPr/>
+                    <a:lstStyle/>
+                    <a:p>
+                      <a:endParaRPr lang="en-US"/>
+                    </a:p>
+                  </a:txBody>
+                  <a:tcPr/>
+                </a:tc>
                 <a:tc>
                   <a:txBody>
                     <a:bodyPr/>

</xml_diff>